<commit_message>
Updating wrap up doc
</commit_message>
<xml_diff>
--- a/BusinessLogic/Docs/EdaWorkshop_WrapUp.pptx
+++ b/BusinessLogic/Docs/EdaWorkshop_WrapUp.pptx
@@ -6,10 +6,14 @@
   </p:sldMasterIdLst>
   <p:sldIdLst>
     <p:sldId id="290" r:id="rId2"/>
-    <p:sldId id="291" r:id="rId3"/>
-    <p:sldId id="310" r:id="rId4"/>
-    <p:sldId id="311" r:id="rId5"/>
-    <p:sldId id="312" r:id="rId6"/>
+    <p:sldId id="317" r:id="rId3"/>
+    <p:sldId id="313" r:id="rId4"/>
+    <p:sldId id="314" r:id="rId5"/>
+    <p:sldId id="315" r:id="rId6"/>
+    <p:sldId id="316" r:id="rId7"/>
+    <p:sldId id="310" r:id="rId8"/>
+    <p:sldId id="291" r:id="rId9"/>
+    <p:sldId id="312" r:id="rId10"/>
   </p:sldIdLst>
   <p:sldSz cx="12192000" cy="6858000"/>
   <p:notesSz cx="6858000" cy="9144000"/>
@@ -247,7 +251,7 @@
           <a:p>
             <a:fld id="{0B5D536D-AE8C-4EAC-8CEB-B18A64A144B4}" type="datetimeFigureOut">
               <a:rPr lang="en-US" smtClean="0"/>
-              <a:t>9/19/2021</a:t>
+              <a:t>10/6/2021</a:t>
             </a:fld>
             <a:endParaRPr lang="en-US"/>
           </a:p>
@@ -417,7 +421,7 @@
           <a:p>
             <a:fld id="{0B5D536D-AE8C-4EAC-8CEB-B18A64A144B4}" type="datetimeFigureOut">
               <a:rPr lang="en-US" smtClean="0"/>
-              <a:t>9/19/2021</a:t>
+              <a:t>10/6/2021</a:t>
             </a:fld>
             <a:endParaRPr lang="en-US"/>
           </a:p>
@@ -597,7 +601,7 @@
           <a:p>
             <a:fld id="{0B5D536D-AE8C-4EAC-8CEB-B18A64A144B4}" type="datetimeFigureOut">
               <a:rPr lang="en-US" smtClean="0"/>
-              <a:t>9/19/2021</a:t>
+              <a:t>10/6/2021</a:t>
             </a:fld>
             <a:endParaRPr lang="en-US"/>
           </a:p>
@@ -767,7 +771,7 @@
           <a:p>
             <a:fld id="{0B5D536D-AE8C-4EAC-8CEB-B18A64A144B4}" type="datetimeFigureOut">
               <a:rPr lang="en-US" smtClean="0"/>
-              <a:t>9/19/2021</a:t>
+              <a:t>10/6/2021</a:t>
             </a:fld>
             <a:endParaRPr lang="en-US"/>
           </a:p>
@@ -1013,7 +1017,7 @@
           <a:p>
             <a:fld id="{0B5D536D-AE8C-4EAC-8CEB-B18A64A144B4}" type="datetimeFigureOut">
               <a:rPr lang="en-US" smtClean="0"/>
-              <a:t>9/19/2021</a:t>
+              <a:t>10/6/2021</a:t>
             </a:fld>
             <a:endParaRPr lang="en-US"/>
           </a:p>
@@ -1245,7 +1249,7 @@
           <a:p>
             <a:fld id="{0B5D536D-AE8C-4EAC-8CEB-B18A64A144B4}" type="datetimeFigureOut">
               <a:rPr lang="en-US" smtClean="0"/>
-              <a:t>9/19/2021</a:t>
+              <a:t>10/6/2021</a:t>
             </a:fld>
             <a:endParaRPr lang="en-US"/>
           </a:p>
@@ -1612,7 +1616,7 @@
           <a:p>
             <a:fld id="{0B5D536D-AE8C-4EAC-8CEB-B18A64A144B4}" type="datetimeFigureOut">
               <a:rPr lang="en-US" smtClean="0"/>
-              <a:t>9/19/2021</a:t>
+              <a:t>10/6/2021</a:t>
             </a:fld>
             <a:endParaRPr lang="en-US"/>
           </a:p>
@@ -1730,7 +1734,7 @@
           <a:p>
             <a:fld id="{0B5D536D-AE8C-4EAC-8CEB-B18A64A144B4}" type="datetimeFigureOut">
               <a:rPr lang="en-US" smtClean="0"/>
-              <a:t>9/19/2021</a:t>
+              <a:t>10/6/2021</a:t>
             </a:fld>
             <a:endParaRPr lang="en-US"/>
           </a:p>
@@ -1825,7 +1829,7 @@
           <a:p>
             <a:fld id="{0B5D536D-AE8C-4EAC-8CEB-B18A64A144B4}" type="datetimeFigureOut">
               <a:rPr lang="en-US" smtClean="0"/>
-              <a:t>9/19/2021</a:t>
+              <a:t>10/6/2021</a:t>
             </a:fld>
             <a:endParaRPr lang="en-US"/>
           </a:p>
@@ -2102,7 +2106,7 @@
           <a:p>
             <a:fld id="{0B5D536D-AE8C-4EAC-8CEB-B18A64A144B4}" type="datetimeFigureOut">
               <a:rPr lang="en-US" smtClean="0"/>
-              <a:t>9/19/2021</a:t>
+              <a:t>10/6/2021</a:t>
             </a:fld>
             <a:endParaRPr lang="en-US"/>
           </a:p>
@@ -2355,7 +2359,7 @@
           <a:p>
             <a:fld id="{0B5D536D-AE8C-4EAC-8CEB-B18A64A144B4}" type="datetimeFigureOut">
               <a:rPr lang="en-US" smtClean="0"/>
-              <a:t>9/19/2021</a:t>
+              <a:t>10/6/2021</a:t>
             </a:fld>
             <a:endParaRPr lang="en-US"/>
           </a:p>
@@ -2568,7 +2572,7 @@
           <a:p>
             <a:fld id="{0B5D536D-AE8C-4EAC-8CEB-B18A64A144B4}" type="datetimeFigureOut">
               <a:rPr lang="en-US" smtClean="0"/>
-              <a:t>9/19/2021</a:t>
+              <a:t>10/6/2021</a:t>
             </a:fld>
             <a:endParaRPr lang="en-US"/>
           </a:p>
@@ -3047,7 +3051,1400 @@
       </p:grpSpPr>
       <p:sp>
         <p:nvSpPr>
-          <p:cNvPr id="4" name="Title 3"/>
+          <p:cNvPr id="3" name="Content Placeholder 2"/>
+          <p:cNvSpPr>
+            <a:spLocks noGrp="1"/>
+          </p:cNvSpPr>
+          <p:nvPr>
+            <p:ph idx="1"/>
+          </p:nvPr>
+        </p:nvSpPr>
+        <p:spPr>
+          <a:xfrm>
+            <a:off x="209006" y="191588"/>
+            <a:ext cx="11773988" cy="6453051"/>
+          </a:xfrm>
+        </p:spPr>
+        <p:txBody>
+          <a:bodyPr/>
+          <a:lstStyle/>
+          <a:p>
+            <a:pPr marL="0" indent="0">
+              <a:buNone/>
+            </a:pPr>
+            <a:r>
+              <a:rPr lang="en-US" dirty="0" smtClean="0"/>
+              <a:t> </a:t>
+            </a:r>
+            <a:endParaRPr lang="en-US" dirty="0"/>
+          </a:p>
+        </p:txBody>
+      </p:sp>
+      <p:sp>
+        <p:nvSpPr>
+          <p:cNvPr id="38" name="Content Placeholder 2"/>
+          <p:cNvSpPr txBox="1">
+            <a:spLocks/>
+          </p:cNvSpPr>
+          <p:nvPr/>
+        </p:nvSpPr>
+        <p:spPr>
+          <a:xfrm>
+            <a:off x="1069848" y="2121408"/>
+            <a:ext cx="10058400" cy="4050792"/>
+          </a:xfrm>
+          <a:prstGeom prst="rect">
+            <a:avLst/>
+          </a:prstGeom>
+        </p:spPr>
+        <p:txBody>
+          <a:bodyPr vert="horz" lIns="91440" tIns="45720" rIns="91440" bIns="45720" rtlCol="0">
+            <a:normAutofit/>
+          </a:bodyPr>
+          <a:lstStyle>
+            <a:lvl1pPr marL="228600" indent="-228600" algn="l" defTabSz="914400" rtl="0" eaLnBrk="1" latinLnBrk="0" hangingPunct="1">
+              <a:lnSpc>
+                <a:spcPct val="100000"/>
+              </a:lnSpc>
+              <a:spcBef>
+                <a:spcPts val="1000"/>
+              </a:spcBef>
+              <a:buClr>
+                <a:schemeClr val="accent2"/>
+              </a:buClr>
+              <a:buFont typeface="Arial" panose="020B0604020202020204" pitchFamily="34" charset="0"/>
+              <a:buChar char="•"/>
+              <a:defRPr sz="1800" kern="1200">
+                <a:solidFill>
+                  <a:schemeClr val="tx1">
+                    <a:lumMod val="85000"/>
+                    <a:lumOff val="15000"/>
+                  </a:schemeClr>
+                </a:solidFill>
+                <a:latin typeface="+mn-lt"/>
+                <a:ea typeface="+mn-ea"/>
+                <a:cs typeface="+mn-cs"/>
+              </a:defRPr>
+            </a:lvl1pPr>
+            <a:lvl2pPr marL="457200" indent="-228600" algn="l" defTabSz="914400" rtl="0" eaLnBrk="1" latinLnBrk="0" hangingPunct="1">
+              <a:lnSpc>
+                <a:spcPct val="100000"/>
+              </a:lnSpc>
+              <a:spcBef>
+                <a:spcPts val="1000"/>
+              </a:spcBef>
+              <a:buClr>
+                <a:schemeClr val="accent2"/>
+              </a:buClr>
+              <a:buFont typeface="Arial" panose="020B0604020202020204" pitchFamily="34" charset="0"/>
+              <a:buChar char="•"/>
+              <a:defRPr sz="1600" kern="1200">
+                <a:solidFill>
+                  <a:schemeClr val="tx1">
+                    <a:lumMod val="85000"/>
+                    <a:lumOff val="15000"/>
+                  </a:schemeClr>
+                </a:solidFill>
+                <a:latin typeface="+mn-lt"/>
+                <a:ea typeface="+mn-ea"/>
+                <a:cs typeface="+mn-cs"/>
+              </a:defRPr>
+            </a:lvl2pPr>
+            <a:lvl3pPr marL="685800" indent="-228600" algn="l" defTabSz="914400" rtl="0" eaLnBrk="1" latinLnBrk="0" hangingPunct="1">
+              <a:lnSpc>
+                <a:spcPct val="100000"/>
+              </a:lnSpc>
+              <a:spcBef>
+                <a:spcPts val="1000"/>
+              </a:spcBef>
+              <a:buClr>
+                <a:schemeClr val="accent2"/>
+              </a:buClr>
+              <a:buFont typeface="Arial" panose="020B0604020202020204" pitchFamily="34" charset="0"/>
+              <a:buChar char="•"/>
+              <a:defRPr sz="1600" kern="1200">
+                <a:solidFill>
+                  <a:schemeClr val="tx1">
+                    <a:lumMod val="85000"/>
+                    <a:lumOff val="15000"/>
+                  </a:schemeClr>
+                </a:solidFill>
+                <a:latin typeface="+mn-lt"/>
+                <a:ea typeface="+mn-ea"/>
+                <a:cs typeface="+mn-cs"/>
+              </a:defRPr>
+            </a:lvl3pPr>
+            <a:lvl4pPr marL="914400" indent="-228600" algn="l" defTabSz="914400" rtl="0" eaLnBrk="1" latinLnBrk="0" hangingPunct="1">
+              <a:lnSpc>
+                <a:spcPct val="100000"/>
+              </a:lnSpc>
+              <a:spcBef>
+                <a:spcPts val="1000"/>
+              </a:spcBef>
+              <a:buClr>
+                <a:schemeClr val="accent2"/>
+              </a:buClr>
+              <a:buFont typeface="Arial" panose="020B0604020202020204" pitchFamily="34" charset="0"/>
+              <a:buChar char="•"/>
+              <a:defRPr sz="1600" kern="1200">
+                <a:solidFill>
+                  <a:schemeClr val="tx1">
+                    <a:lumMod val="85000"/>
+                    <a:lumOff val="15000"/>
+                  </a:schemeClr>
+                </a:solidFill>
+                <a:latin typeface="+mn-lt"/>
+                <a:ea typeface="+mn-ea"/>
+                <a:cs typeface="+mn-cs"/>
+              </a:defRPr>
+            </a:lvl4pPr>
+            <a:lvl5pPr marL="1143000" indent="-228600" algn="l" defTabSz="914400" rtl="0" eaLnBrk="1" latinLnBrk="0" hangingPunct="1">
+              <a:lnSpc>
+                <a:spcPct val="100000"/>
+              </a:lnSpc>
+              <a:spcBef>
+                <a:spcPts val="1000"/>
+              </a:spcBef>
+              <a:buClr>
+                <a:schemeClr val="accent2"/>
+              </a:buClr>
+              <a:buFont typeface="Arial" panose="020B0604020202020204" pitchFamily="34" charset="0"/>
+              <a:buChar char="•"/>
+              <a:defRPr sz="1600" kern="1200">
+                <a:solidFill>
+                  <a:schemeClr val="tx1">
+                    <a:lumMod val="85000"/>
+                    <a:lumOff val="15000"/>
+                  </a:schemeClr>
+                </a:solidFill>
+                <a:latin typeface="+mn-lt"/>
+                <a:ea typeface="+mn-ea"/>
+                <a:cs typeface="+mn-cs"/>
+              </a:defRPr>
+            </a:lvl5pPr>
+            <a:lvl6pPr marL="1312863" indent="-228600" algn="l" defTabSz="914400" rtl="0" eaLnBrk="1" latinLnBrk="0" hangingPunct="1">
+              <a:lnSpc>
+                <a:spcPct val="100000"/>
+              </a:lnSpc>
+              <a:spcBef>
+                <a:spcPts val="1000"/>
+              </a:spcBef>
+              <a:buClr>
+                <a:schemeClr val="accent2"/>
+              </a:buClr>
+              <a:buFont typeface="Arial" panose="020B0604020202020204" pitchFamily="34" charset="0"/>
+              <a:buChar char="•"/>
+              <a:defRPr sz="1600" kern="1200">
+                <a:solidFill>
+                  <a:schemeClr val="tx1"/>
+                </a:solidFill>
+                <a:latin typeface="+mn-lt"/>
+                <a:ea typeface="+mn-ea"/>
+                <a:cs typeface="+mn-cs"/>
+              </a:defRPr>
+            </a:lvl6pPr>
+            <a:lvl7pPr marL="1484313" indent="-228600" algn="l" defTabSz="914400" rtl="0" eaLnBrk="1" latinLnBrk="0" hangingPunct="1">
+              <a:lnSpc>
+                <a:spcPct val="100000"/>
+              </a:lnSpc>
+              <a:spcBef>
+                <a:spcPts val="1000"/>
+              </a:spcBef>
+              <a:buClr>
+                <a:schemeClr val="accent2"/>
+              </a:buClr>
+              <a:buFont typeface="Arial" panose="020B0604020202020204" pitchFamily="34" charset="0"/>
+              <a:buChar char="•"/>
+              <a:defRPr sz="1600" kern="1200">
+                <a:solidFill>
+                  <a:schemeClr val="tx1"/>
+                </a:solidFill>
+                <a:latin typeface="+mn-lt"/>
+                <a:ea typeface="+mn-ea"/>
+                <a:cs typeface="+mn-cs"/>
+              </a:defRPr>
+            </a:lvl7pPr>
+            <a:lvl8pPr marL="1657350" indent="-228600" algn="l" defTabSz="914400" rtl="0" eaLnBrk="1" latinLnBrk="0" hangingPunct="1">
+              <a:lnSpc>
+                <a:spcPct val="100000"/>
+              </a:lnSpc>
+              <a:spcBef>
+                <a:spcPts val="1000"/>
+              </a:spcBef>
+              <a:buClr>
+                <a:schemeClr val="accent2"/>
+              </a:buClr>
+              <a:buFont typeface="Arial" panose="020B0604020202020204" pitchFamily="34" charset="0"/>
+              <a:buChar char="•"/>
+              <a:defRPr sz="1600" kern="1200" baseline="0">
+                <a:solidFill>
+                  <a:schemeClr val="tx1"/>
+                </a:solidFill>
+                <a:latin typeface="+mn-lt"/>
+                <a:ea typeface="+mn-ea"/>
+                <a:cs typeface="+mn-cs"/>
+              </a:defRPr>
+            </a:lvl8pPr>
+            <a:lvl9pPr marL="1882775" indent="-228600" algn="l" defTabSz="914400" rtl="0" eaLnBrk="1" latinLnBrk="0" hangingPunct="1">
+              <a:lnSpc>
+                <a:spcPct val="100000"/>
+              </a:lnSpc>
+              <a:spcBef>
+                <a:spcPts val="1000"/>
+              </a:spcBef>
+              <a:buClr>
+                <a:schemeClr val="accent2"/>
+              </a:buClr>
+              <a:buFont typeface="Arial" panose="020B0604020202020204" pitchFamily="34" charset="0"/>
+              <a:buChar char="•"/>
+              <a:defRPr sz="1600" kern="1200" baseline="0">
+                <a:solidFill>
+                  <a:schemeClr val="tx1"/>
+                </a:solidFill>
+                <a:latin typeface="+mn-lt"/>
+                <a:ea typeface="+mn-ea"/>
+                <a:cs typeface="+mn-cs"/>
+              </a:defRPr>
+            </a:lvl9pPr>
+          </a:lstStyle>
+          <a:p>
+            <a:pPr marL="0" indent="0">
+              <a:buFont typeface="Arial" panose="020B0604020202020204" pitchFamily="34" charset="0"/>
+              <a:buNone/>
+            </a:pPr>
+            <a:r>
+              <a:rPr lang="en-US" smtClean="0"/>
+              <a:t> </a:t>
+            </a:r>
+            <a:endParaRPr lang="en-US" dirty="0"/>
+          </a:p>
+        </p:txBody>
+      </p:sp>
+      <p:sp>
+        <p:nvSpPr>
+          <p:cNvPr id="39" name="Rectangle 38"/>
+          <p:cNvSpPr/>
+          <p:nvPr/>
+        </p:nvSpPr>
+        <p:spPr>
+          <a:xfrm>
+            <a:off x="673189" y="3929672"/>
+            <a:ext cx="1212783" cy="933650"/>
+          </a:xfrm>
+          <a:prstGeom prst="rect">
+            <a:avLst/>
+          </a:prstGeom>
+        </p:spPr>
+        <p:style>
+          <a:lnRef idx="2">
+            <a:schemeClr val="accent1">
+              <a:shade val="50000"/>
+            </a:schemeClr>
+          </a:lnRef>
+          <a:fillRef idx="1">
+            <a:schemeClr val="accent1"/>
+          </a:fillRef>
+          <a:effectRef idx="0">
+            <a:schemeClr val="accent1"/>
+          </a:effectRef>
+          <a:fontRef idx="minor">
+            <a:schemeClr val="lt1"/>
+          </a:fontRef>
+        </p:style>
+        <p:txBody>
+          <a:bodyPr rtlCol="0" anchor="ctr"/>
+          <a:lstStyle/>
+          <a:p>
+            <a:pPr algn="ctr"/>
+            <a:r>
+              <a:rPr lang="en-US" dirty="0" smtClean="0"/>
+              <a:t>Provider </a:t>
+            </a:r>
+            <a:r>
+              <a:rPr lang="en-US" dirty="0"/>
+              <a:t>Transfer Service</a:t>
+            </a:r>
+          </a:p>
+        </p:txBody>
+      </p:sp>
+      <p:sp>
+        <p:nvSpPr>
+          <p:cNvPr id="40" name="Rectangle 39"/>
+          <p:cNvSpPr/>
+          <p:nvPr/>
+        </p:nvSpPr>
+        <p:spPr>
+          <a:xfrm>
+            <a:off x="4597658" y="2121408"/>
+            <a:ext cx="1212783" cy="933650"/>
+          </a:xfrm>
+          <a:prstGeom prst="rect">
+            <a:avLst/>
+          </a:prstGeom>
+        </p:spPr>
+        <p:style>
+          <a:lnRef idx="2">
+            <a:schemeClr val="accent1">
+              <a:shade val="50000"/>
+            </a:schemeClr>
+          </a:lnRef>
+          <a:fillRef idx="1">
+            <a:schemeClr val="accent1"/>
+          </a:fillRef>
+          <a:effectRef idx="0">
+            <a:schemeClr val="accent1"/>
+          </a:effectRef>
+          <a:fontRef idx="minor">
+            <a:schemeClr val="lt1"/>
+          </a:fontRef>
+        </p:style>
+        <p:txBody>
+          <a:bodyPr rtlCol="0" anchor="ctr"/>
+          <a:lstStyle/>
+          <a:p>
+            <a:pPr algn="ctr"/>
+            <a:r>
+              <a:rPr lang="en-US" dirty="0" smtClean="0"/>
+              <a:t>Auto Approval</a:t>
+            </a:r>
+          </a:p>
+          <a:p>
+            <a:pPr algn="ctr"/>
+            <a:r>
+              <a:rPr lang="en-US" dirty="0" smtClean="0"/>
+              <a:t>Service</a:t>
+            </a:r>
+            <a:endParaRPr lang="en-US" dirty="0"/>
+          </a:p>
+        </p:txBody>
+      </p:sp>
+      <p:sp>
+        <p:nvSpPr>
+          <p:cNvPr id="41" name="Can 40"/>
+          <p:cNvSpPr/>
+          <p:nvPr/>
+        </p:nvSpPr>
+        <p:spPr>
+          <a:xfrm rot="5400000">
+            <a:off x="7202935" y="1077330"/>
+            <a:ext cx="741145" cy="6676660"/>
+          </a:xfrm>
+          <a:prstGeom prst="can">
+            <a:avLst/>
+          </a:prstGeom>
+        </p:spPr>
+        <p:style>
+          <a:lnRef idx="2">
+            <a:schemeClr val="accent1">
+              <a:shade val="50000"/>
+            </a:schemeClr>
+          </a:lnRef>
+          <a:fillRef idx="1">
+            <a:schemeClr val="accent1"/>
+          </a:fillRef>
+          <a:effectRef idx="0">
+            <a:schemeClr val="accent1"/>
+          </a:effectRef>
+          <a:fontRef idx="minor">
+            <a:schemeClr val="lt1"/>
+          </a:fontRef>
+        </p:style>
+        <p:txBody>
+          <a:bodyPr vert="vert270" rtlCol="0" anchor="ctr"/>
+          <a:lstStyle/>
+          <a:p>
+            <a:pPr algn="ctr"/>
+            <a:r>
+              <a:rPr lang="en-US" dirty="0" smtClean="0"/>
+              <a:t>Message Bus</a:t>
+            </a:r>
+            <a:endParaRPr lang="en-US" dirty="0"/>
+          </a:p>
+        </p:txBody>
+      </p:sp>
+      <p:sp>
+        <p:nvSpPr>
+          <p:cNvPr id="42" name="Rectangle 41"/>
+          <p:cNvSpPr/>
+          <p:nvPr/>
+        </p:nvSpPr>
+        <p:spPr>
+          <a:xfrm>
+            <a:off x="8372402" y="2121408"/>
+            <a:ext cx="1212783" cy="933650"/>
+          </a:xfrm>
+          <a:prstGeom prst="rect">
+            <a:avLst/>
+          </a:prstGeom>
+        </p:spPr>
+        <p:style>
+          <a:lnRef idx="2">
+            <a:schemeClr val="accent1">
+              <a:shade val="50000"/>
+            </a:schemeClr>
+          </a:lnRef>
+          <a:fillRef idx="1">
+            <a:schemeClr val="accent1"/>
+          </a:fillRef>
+          <a:effectRef idx="0">
+            <a:schemeClr val="accent1"/>
+          </a:effectRef>
+          <a:fontRef idx="minor">
+            <a:schemeClr val="lt1"/>
+          </a:fontRef>
+        </p:style>
+        <p:txBody>
+          <a:bodyPr rtlCol="0" anchor="ctr"/>
+          <a:lstStyle/>
+          <a:p>
+            <a:pPr algn="ctr"/>
+            <a:r>
+              <a:rPr lang="en-US" dirty="0" smtClean="0"/>
+              <a:t>Routing Service</a:t>
+            </a:r>
+            <a:endParaRPr lang="en-US" dirty="0"/>
+          </a:p>
+        </p:txBody>
+      </p:sp>
+      <p:sp>
+        <p:nvSpPr>
+          <p:cNvPr id="43" name="Rectangle 42"/>
+          <p:cNvSpPr/>
+          <p:nvPr/>
+        </p:nvSpPr>
+        <p:spPr>
+          <a:xfrm>
+            <a:off x="6967115" y="5320618"/>
+            <a:ext cx="1212783" cy="933650"/>
+          </a:xfrm>
+          <a:prstGeom prst="rect">
+            <a:avLst/>
+          </a:prstGeom>
+        </p:spPr>
+        <p:style>
+          <a:lnRef idx="2">
+            <a:schemeClr val="accent1">
+              <a:shade val="50000"/>
+            </a:schemeClr>
+          </a:lnRef>
+          <a:fillRef idx="1">
+            <a:schemeClr val="accent1"/>
+          </a:fillRef>
+          <a:effectRef idx="0">
+            <a:schemeClr val="accent1"/>
+          </a:effectRef>
+          <a:fontRef idx="minor">
+            <a:schemeClr val="lt1"/>
+          </a:fontRef>
+        </p:style>
+        <p:txBody>
+          <a:bodyPr rtlCol="0" anchor="ctr"/>
+          <a:lstStyle/>
+          <a:p>
+            <a:pPr algn="ctr"/>
+            <a:r>
+              <a:rPr lang="en-US" dirty="0" smtClean="0"/>
+              <a:t>User Interface</a:t>
+            </a:r>
+            <a:endParaRPr lang="en-US" dirty="0"/>
+          </a:p>
+        </p:txBody>
+      </p:sp>
+      <p:sp>
+        <p:nvSpPr>
+          <p:cNvPr id="44" name="TextBox 43"/>
+          <p:cNvSpPr txBox="1"/>
+          <p:nvPr/>
+        </p:nvSpPr>
+        <p:spPr>
+          <a:xfrm>
+            <a:off x="2418928" y="4074758"/>
+            <a:ext cx="1239311" cy="230832"/>
+          </a:xfrm>
+          <a:prstGeom prst="rect">
+            <a:avLst/>
+          </a:prstGeom>
+          <a:noFill/>
+        </p:spPr>
+        <p:txBody>
+          <a:bodyPr wrap="square" rtlCol="0">
+            <a:spAutoFit/>
+          </a:bodyPr>
+          <a:lstStyle/>
+          <a:p>
+            <a:pPr algn="ctr"/>
+            <a:r>
+              <a:rPr lang="en-US" sz="900" dirty="0"/>
+              <a:t>Received </a:t>
+            </a:r>
+            <a:r>
+              <a:rPr lang="en-US" sz="900" dirty="0" smtClean="0"/>
+              <a:t>Requests</a:t>
+            </a:r>
+            <a:endParaRPr lang="en-US" sz="900" dirty="0"/>
+          </a:p>
+        </p:txBody>
+      </p:sp>
+      <p:cxnSp>
+        <p:nvCxnSpPr>
+          <p:cNvPr id="45" name="Straight Arrow Connector 44"/>
+          <p:cNvCxnSpPr/>
+          <p:nvPr/>
+        </p:nvCxnSpPr>
+        <p:spPr>
+          <a:xfrm>
+            <a:off x="1885972" y="4249284"/>
+            <a:ext cx="2359818" cy="27221"/>
+          </a:xfrm>
+          <a:prstGeom prst="straightConnector1">
+            <a:avLst/>
+          </a:prstGeom>
+          <a:ln>
+            <a:tailEnd type="triangle"/>
+          </a:ln>
+        </p:spPr>
+        <p:style>
+          <a:lnRef idx="1">
+            <a:schemeClr val="accent1"/>
+          </a:lnRef>
+          <a:fillRef idx="0">
+            <a:schemeClr val="accent1"/>
+          </a:fillRef>
+          <a:effectRef idx="0">
+            <a:schemeClr val="accent1"/>
+          </a:effectRef>
+          <a:fontRef idx="minor">
+            <a:schemeClr val="tx1"/>
+          </a:fontRef>
+        </p:style>
+      </p:cxnSp>
+      <p:cxnSp>
+        <p:nvCxnSpPr>
+          <p:cNvPr id="46" name="Straight Arrow Connector 45"/>
+          <p:cNvCxnSpPr/>
+          <p:nvPr/>
+        </p:nvCxnSpPr>
+        <p:spPr>
+          <a:xfrm flipV="1">
+            <a:off x="4597658" y="3055058"/>
+            <a:ext cx="0" cy="990029"/>
+          </a:xfrm>
+          <a:prstGeom prst="straightConnector1">
+            <a:avLst/>
+          </a:prstGeom>
+          <a:ln>
+            <a:tailEnd type="triangle"/>
+          </a:ln>
+        </p:spPr>
+        <p:style>
+          <a:lnRef idx="1">
+            <a:schemeClr val="accent1"/>
+          </a:lnRef>
+          <a:fillRef idx="0">
+            <a:schemeClr val="accent1"/>
+          </a:fillRef>
+          <a:effectRef idx="0">
+            <a:schemeClr val="accent1"/>
+          </a:effectRef>
+          <a:fontRef idx="minor">
+            <a:schemeClr val="tx1"/>
+          </a:fontRef>
+        </p:style>
+      </p:cxnSp>
+      <p:sp>
+        <p:nvSpPr>
+          <p:cNvPr id="47" name="TextBox 46"/>
+          <p:cNvSpPr txBox="1"/>
+          <p:nvPr/>
+        </p:nvSpPr>
+        <p:spPr>
+          <a:xfrm>
+            <a:off x="4256667" y="3166991"/>
+            <a:ext cx="699008" cy="369332"/>
+          </a:xfrm>
+          <a:prstGeom prst="rect">
+            <a:avLst/>
+          </a:prstGeom>
+          <a:noFill/>
+        </p:spPr>
+        <p:txBody>
+          <a:bodyPr wrap="square" rtlCol="0">
+            <a:spAutoFit/>
+          </a:bodyPr>
+          <a:lstStyle/>
+          <a:p>
+            <a:pPr algn="ctr"/>
+            <a:r>
+              <a:rPr lang="en-US" sz="900" dirty="0"/>
+              <a:t>Received Requests</a:t>
+            </a:r>
+          </a:p>
+        </p:txBody>
+      </p:sp>
+      <p:cxnSp>
+        <p:nvCxnSpPr>
+          <p:cNvPr id="48" name="Straight Arrow Connector 47"/>
+          <p:cNvCxnSpPr/>
+          <p:nvPr/>
+        </p:nvCxnSpPr>
+        <p:spPr>
+          <a:xfrm>
+            <a:off x="5171962" y="3055058"/>
+            <a:ext cx="0" cy="990029"/>
+          </a:xfrm>
+          <a:prstGeom prst="straightConnector1">
+            <a:avLst/>
+          </a:prstGeom>
+          <a:ln>
+            <a:tailEnd type="triangle"/>
+          </a:ln>
+        </p:spPr>
+        <p:style>
+          <a:lnRef idx="1">
+            <a:schemeClr val="accent1"/>
+          </a:lnRef>
+          <a:fillRef idx="0">
+            <a:schemeClr val="accent1"/>
+          </a:fillRef>
+          <a:effectRef idx="0">
+            <a:schemeClr val="accent1"/>
+          </a:effectRef>
+          <a:fontRef idx="minor">
+            <a:schemeClr val="tx1"/>
+          </a:fontRef>
+        </p:style>
+      </p:cxnSp>
+      <p:sp>
+        <p:nvSpPr>
+          <p:cNvPr id="49" name="TextBox 48"/>
+          <p:cNvSpPr txBox="1"/>
+          <p:nvPr/>
+        </p:nvSpPr>
+        <p:spPr>
+          <a:xfrm>
+            <a:off x="4800420" y="3521846"/>
+            <a:ext cx="757877" cy="369332"/>
+          </a:xfrm>
+          <a:prstGeom prst="rect">
+            <a:avLst/>
+          </a:prstGeom>
+          <a:noFill/>
+        </p:spPr>
+        <p:txBody>
+          <a:bodyPr wrap="square" rtlCol="0">
+            <a:spAutoFit/>
+          </a:bodyPr>
+          <a:lstStyle/>
+          <a:p>
+            <a:pPr algn="ctr"/>
+            <a:r>
+              <a:rPr lang="en-US" sz="900" dirty="0"/>
+              <a:t>Decided Requests</a:t>
+            </a:r>
+          </a:p>
+        </p:txBody>
+      </p:sp>
+      <p:cxnSp>
+        <p:nvCxnSpPr>
+          <p:cNvPr id="50" name="Straight Arrow Connector 49"/>
+          <p:cNvCxnSpPr/>
+          <p:nvPr/>
+        </p:nvCxnSpPr>
+        <p:spPr>
+          <a:xfrm>
+            <a:off x="5741819" y="3055058"/>
+            <a:ext cx="0" cy="990029"/>
+          </a:xfrm>
+          <a:prstGeom prst="straightConnector1">
+            <a:avLst/>
+          </a:prstGeom>
+          <a:ln>
+            <a:tailEnd type="triangle"/>
+          </a:ln>
+        </p:spPr>
+        <p:style>
+          <a:lnRef idx="1">
+            <a:schemeClr val="accent1"/>
+          </a:lnRef>
+          <a:fillRef idx="0">
+            <a:schemeClr val="accent1"/>
+          </a:fillRef>
+          <a:effectRef idx="0">
+            <a:schemeClr val="accent1"/>
+          </a:effectRef>
+          <a:fontRef idx="minor">
+            <a:schemeClr val="tx1"/>
+          </a:fontRef>
+        </p:style>
+      </p:cxnSp>
+      <p:sp>
+        <p:nvSpPr>
+          <p:cNvPr id="51" name="TextBox 50"/>
+          <p:cNvSpPr txBox="1"/>
+          <p:nvPr/>
+        </p:nvSpPr>
+        <p:spPr>
+          <a:xfrm>
+            <a:off x="5398322" y="3097741"/>
+            <a:ext cx="757877" cy="507831"/>
+          </a:xfrm>
+          <a:prstGeom prst="rect">
+            <a:avLst/>
+          </a:prstGeom>
+          <a:noFill/>
+        </p:spPr>
+        <p:txBody>
+          <a:bodyPr wrap="square" rtlCol="0">
+            <a:spAutoFit/>
+          </a:bodyPr>
+          <a:lstStyle/>
+          <a:p>
+            <a:pPr algn="ctr"/>
+            <a:r>
+              <a:rPr lang="en-US" sz="900" dirty="0" smtClean="0"/>
+              <a:t>Not Auto </a:t>
+            </a:r>
+            <a:r>
+              <a:rPr lang="en-US" sz="900" dirty="0"/>
+              <a:t>Approved </a:t>
+            </a:r>
+            <a:r>
+              <a:rPr lang="en-US" sz="900" dirty="0" smtClean="0"/>
+              <a:t>Requests</a:t>
+            </a:r>
+            <a:endParaRPr lang="en-US" sz="900" dirty="0"/>
+          </a:p>
+        </p:txBody>
+      </p:sp>
+      <p:sp>
+        <p:nvSpPr>
+          <p:cNvPr id="52" name="TextBox 51"/>
+          <p:cNvSpPr txBox="1"/>
+          <p:nvPr/>
+        </p:nvSpPr>
+        <p:spPr>
+          <a:xfrm>
+            <a:off x="7624603" y="2096250"/>
+            <a:ext cx="757877" cy="507831"/>
+          </a:xfrm>
+          <a:prstGeom prst="rect">
+            <a:avLst/>
+          </a:prstGeom>
+          <a:noFill/>
+        </p:spPr>
+        <p:txBody>
+          <a:bodyPr wrap="square" rtlCol="0">
+            <a:spAutoFit/>
+          </a:bodyPr>
+          <a:lstStyle/>
+          <a:p>
+            <a:pPr algn="ctr"/>
+            <a:r>
+              <a:rPr lang="en-US" sz="900" dirty="0"/>
+              <a:t>Not Auto Approved Requests</a:t>
+            </a:r>
+          </a:p>
+        </p:txBody>
+      </p:sp>
+      <p:sp>
+        <p:nvSpPr>
+          <p:cNvPr id="53" name="TextBox 52"/>
+          <p:cNvSpPr txBox="1"/>
+          <p:nvPr/>
+        </p:nvSpPr>
+        <p:spPr>
+          <a:xfrm>
+            <a:off x="8000217" y="5200024"/>
+            <a:ext cx="1118606" cy="369332"/>
+          </a:xfrm>
+          <a:prstGeom prst="rect">
+            <a:avLst/>
+          </a:prstGeom>
+          <a:noFill/>
+        </p:spPr>
+        <p:txBody>
+          <a:bodyPr wrap="square" rtlCol="0">
+            <a:spAutoFit/>
+          </a:bodyPr>
+          <a:lstStyle/>
+          <a:p>
+            <a:pPr algn="ctr"/>
+            <a:r>
+              <a:rPr lang="en-US" sz="900" dirty="0" smtClean="0"/>
+              <a:t>Get</a:t>
+            </a:r>
+          </a:p>
+          <a:p>
+            <a:pPr algn="ctr"/>
+            <a:r>
+              <a:rPr lang="en-US" sz="900" dirty="0" smtClean="0"/>
+              <a:t>Request</a:t>
+            </a:r>
+            <a:endParaRPr lang="en-US" sz="900" dirty="0"/>
+          </a:p>
+        </p:txBody>
+      </p:sp>
+      <p:sp>
+        <p:nvSpPr>
+          <p:cNvPr id="54" name="TextBox 53"/>
+          <p:cNvSpPr txBox="1"/>
+          <p:nvPr/>
+        </p:nvSpPr>
+        <p:spPr>
+          <a:xfrm>
+            <a:off x="8005393" y="3372722"/>
+            <a:ext cx="642983" cy="369332"/>
+          </a:xfrm>
+          <a:prstGeom prst="rect">
+            <a:avLst/>
+          </a:prstGeom>
+          <a:noFill/>
+        </p:spPr>
+        <p:txBody>
+          <a:bodyPr wrap="square" rtlCol="0">
+            <a:spAutoFit/>
+          </a:bodyPr>
+          <a:lstStyle/>
+          <a:p>
+            <a:pPr algn="ctr"/>
+            <a:r>
+              <a:rPr lang="en-US" sz="900" dirty="0" smtClean="0"/>
+              <a:t>Get Request</a:t>
+            </a:r>
+            <a:endParaRPr lang="en-US" sz="900" dirty="0"/>
+          </a:p>
+        </p:txBody>
+      </p:sp>
+      <p:cxnSp>
+        <p:nvCxnSpPr>
+          <p:cNvPr id="55" name="Straight Arrow Connector 54"/>
+          <p:cNvCxnSpPr/>
+          <p:nvPr/>
+        </p:nvCxnSpPr>
+        <p:spPr>
+          <a:xfrm flipV="1">
+            <a:off x="9253282" y="3097742"/>
+            <a:ext cx="10410" cy="939228"/>
+          </a:xfrm>
+          <a:prstGeom prst="straightConnector1">
+            <a:avLst/>
+          </a:prstGeom>
+          <a:ln>
+            <a:tailEnd type="triangle"/>
+          </a:ln>
+        </p:spPr>
+        <p:style>
+          <a:lnRef idx="1">
+            <a:schemeClr val="accent1"/>
+          </a:lnRef>
+          <a:fillRef idx="0">
+            <a:schemeClr val="accent1"/>
+          </a:fillRef>
+          <a:effectRef idx="0">
+            <a:schemeClr val="accent1"/>
+          </a:effectRef>
+          <a:fontRef idx="minor">
+            <a:schemeClr val="tx1"/>
+          </a:fontRef>
+        </p:style>
+      </p:cxnSp>
+      <p:sp>
+        <p:nvSpPr>
+          <p:cNvPr id="56" name="TextBox 55"/>
+          <p:cNvSpPr txBox="1"/>
+          <p:nvPr/>
+        </p:nvSpPr>
+        <p:spPr>
+          <a:xfrm>
+            <a:off x="9187328" y="3384713"/>
+            <a:ext cx="642983" cy="369332"/>
+          </a:xfrm>
+          <a:prstGeom prst="rect">
+            <a:avLst/>
+          </a:prstGeom>
+          <a:noFill/>
+        </p:spPr>
+        <p:txBody>
+          <a:bodyPr wrap="square" rtlCol="0">
+            <a:spAutoFit/>
+          </a:bodyPr>
+          <a:lstStyle/>
+          <a:p>
+            <a:pPr algn="ctr"/>
+            <a:r>
+              <a:rPr lang="en-US" sz="900" dirty="0"/>
+              <a:t>Decided Requests</a:t>
+            </a:r>
+          </a:p>
+        </p:txBody>
+      </p:sp>
+      <p:sp>
+        <p:nvSpPr>
+          <p:cNvPr id="57" name="TextBox 56"/>
+          <p:cNvSpPr txBox="1"/>
+          <p:nvPr/>
+        </p:nvSpPr>
+        <p:spPr>
+          <a:xfrm>
+            <a:off x="8488378" y="5752315"/>
+            <a:ext cx="1118606" cy="230832"/>
+          </a:xfrm>
+          <a:prstGeom prst="rect">
+            <a:avLst/>
+          </a:prstGeom>
+          <a:noFill/>
+        </p:spPr>
+        <p:txBody>
+          <a:bodyPr wrap="square" rtlCol="0">
+            <a:spAutoFit/>
+          </a:bodyPr>
+          <a:lstStyle/>
+          <a:p>
+            <a:pPr algn="ctr"/>
+            <a:r>
+              <a:rPr lang="en-US" sz="900" dirty="0"/>
+              <a:t>Decided Requests</a:t>
+            </a:r>
+          </a:p>
+        </p:txBody>
+      </p:sp>
+      <p:sp>
+        <p:nvSpPr>
+          <p:cNvPr id="58" name="TextBox 57"/>
+          <p:cNvSpPr txBox="1"/>
+          <p:nvPr/>
+        </p:nvSpPr>
+        <p:spPr>
+          <a:xfrm>
+            <a:off x="9376325" y="2251201"/>
+            <a:ext cx="1229098" cy="369332"/>
+          </a:xfrm>
+          <a:prstGeom prst="rect">
+            <a:avLst/>
+          </a:prstGeom>
+          <a:noFill/>
+        </p:spPr>
+        <p:txBody>
+          <a:bodyPr wrap="square" rtlCol="0">
+            <a:spAutoFit/>
+          </a:bodyPr>
+          <a:lstStyle/>
+          <a:p>
+            <a:pPr algn="ctr"/>
+            <a:r>
+              <a:rPr lang="en-US" sz="900" dirty="0" smtClean="0"/>
+              <a:t>Request</a:t>
+            </a:r>
+          </a:p>
+          <a:p>
+            <a:pPr algn="ctr"/>
+            <a:r>
+              <a:rPr lang="en-US" sz="900" dirty="0" smtClean="0"/>
+              <a:t>Assigned</a:t>
+            </a:r>
+            <a:endParaRPr lang="en-US" sz="900" dirty="0"/>
+          </a:p>
+        </p:txBody>
+      </p:sp>
+      <p:cxnSp>
+        <p:nvCxnSpPr>
+          <p:cNvPr id="59" name="Straight Arrow Connector 58"/>
+          <p:cNvCxnSpPr/>
+          <p:nvPr/>
+        </p:nvCxnSpPr>
+        <p:spPr>
+          <a:xfrm flipV="1">
+            <a:off x="8555850" y="3070468"/>
+            <a:ext cx="0" cy="966502"/>
+          </a:xfrm>
+          <a:prstGeom prst="straightConnector1">
+            <a:avLst/>
+          </a:prstGeom>
+          <a:ln>
+            <a:tailEnd type="triangle"/>
+          </a:ln>
+        </p:spPr>
+        <p:style>
+          <a:lnRef idx="1">
+            <a:schemeClr val="accent1"/>
+          </a:lnRef>
+          <a:fillRef idx="0">
+            <a:schemeClr val="accent1"/>
+          </a:fillRef>
+          <a:effectRef idx="0">
+            <a:schemeClr val="accent1"/>
+          </a:effectRef>
+          <a:fontRef idx="minor">
+            <a:schemeClr val="tx1"/>
+          </a:fontRef>
+        </p:style>
+      </p:cxnSp>
+      <p:cxnSp>
+        <p:nvCxnSpPr>
+          <p:cNvPr id="60" name="Elbow Connector 59"/>
+          <p:cNvCxnSpPr>
+            <a:endCxn id="43" idx="1"/>
+          </p:cNvCxnSpPr>
+          <p:nvPr/>
+        </p:nvCxnSpPr>
+        <p:spPr>
+          <a:xfrm rot="16200000" flipH="1">
+            <a:off x="6164931" y="4985259"/>
+            <a:ext cx="985800" cy="618568"/>
+          </a:xfrm>
+          <a:prstGeom prst="bentConnector2">
+            <a:avLst/>
+          </a:prstGeom>
+          <a:ln>
+            <a:tailEnd type="triangle"/>
+          </a:ln>
+        </p:spPr>
+        <p:style>
+          <a:lnRef idx="1">
+            <a:schemeClr val="accent1"/>
+          </a:lnRef>
+          <a:fillRef idx="0">
+            <a:schemeClr val="accent1"/>
+          </a:fillRef>
+          <a:effectRef idx="0">
+            <a:schemeClr val="accent1"/>
+          </a:effectRef>
+          <a:fontRef idx="minor">
+            <a:schemeClr val="tx1"/>
+          </a:fontRef>
+        </p:style>
+      </p:cxnSp>
+      <p:sp>
+        <p:nvSpPr>
+          <p:cNvPr id="61" name="TextBox 60"/>
+          <p:cNvSpPr txBox="1"/>
+          <p:nvPr/>
+        </p:nvSpPr>
+        <p:spPr>
+          <a:xfrm>
+            <a:off x="6011875" y="5440986"/>
+            <a:ext cx="1229098" cy="369332"/>
+          </a:xfrm>
+          <a:prstGeom prst="rect">
+            <a:avLst/>
+          </a:prstGeom>
+          <a:noFill/>
+        </p:spPr>
+        <p:txBody>
+          <a:bodyPr wrap="square" rtlCol="0">
+            <a:spAutoFit/>
+          </a:bodyPr>
+          <a:lstStyle/>
+          <a:p>
+            <a:pPr algn="ctr"/>
+            <a:r>
+              <a:rPr lang="en-US" sz="900" dirty="0" smtClean="0"/>
+              <a:t>Request</a:t>
+            </a:r>
+          </a:p>
+          <a:p>
+            <a:pPr algn="ctr"/>
+            <a:r>
+              <a:rPr lang="en-US" sz="900" dirty="0" smtClean="0"/>
+              <a:t>Assigned</a:t>
+            </a:r>
+            <a:endParaRPr lang="en-US" sz="900" dirty="0"/>
+          </a:p>
+        </p:txBody>
+      </p:sp>
+      <p:cxnSp>
+        <p:nvCxnSpPr>
+          <p:cNvPr id="62" name="Elbow Connector 61"/>
+          <p:cNvCxnSpPr/>
+          <p:nvPr/>
+        </p:nvCxnSpPr>
+        <p:spPr>
+          <a:xfrm rot="5400000" flipH="1" flipV="1">
+            <a:off x="8178466" y="4831413"/>
+            <a:ext cx="754768" cy="719274"/>
+          </a:xfrm>
+          <a:prstGeom prst="bentConnector3">
+            <a:avLst>
+              <a:gd name="adj1" fmla="val 599"/>
+            </a:avLst>
+          </a:prstGeom>
+          <a:ln>
+            <a:tailEnd type="triangle"/>
+          </a:ln>
+        </p:spPr>
+        <p:style>
+          <a:lnRef idx="1">
+            <a:schemeClr val="accent1"/>
+          </a:lnRef>
+          <a:fillRef idx="0">
+            <a:schemeClr val="accent1"/>
+          </a:fillRef>
+          <a:effectRef idx="0">
+            <a:schemeClr val="accent1"/>
+          </a:effectRef>
+          <a:fontRef idx="minor">
+            <a:schemeClr val="tx1"/>
+          </a:fontRef>
+        </p:style>
+      </p:cxnSp>
+      <p:cxnSp>
+        <p:nvCxnSpPr>
+          <p:cNvPr id="63" name="Elbow Connector 62"/>
+          <p:cNvCxnSpPr/>
+          <p:nvPr/>
+        </p:nvCxnSpPr>
+        <p:spPr>
+          <a:xfrm flipV="1">
+            <a:off x="8179898" y="4813665"/>
+            <a:ext cx="1394876" cy="1198052"/>
+          </a:xfrm>
+          <a:prstGeom prst="bentConnector3">
+            <a:avLst>
+              <a:gd name="adj1" fmla="val 99946"/>
+            </a:avLst>
+          </a:prstGeom>
+          <a:ln>
+            <a:tailEnd type="triangle"/>
+          </a:ln>
+        </p:spPr>
+        <p:style>
+          <a:lnRef idx="1">
+            <a:schemeClr val="accent1"/>
+          </a:lnRef>
+          <a:fillRef idx="0">
+            <a:schemeClr val="accent1"/>
+          </a:fillRef>
+          <a:effectRef idx="0">
+            <a:schemeClr val="accent1"/>
+          </a:effectRef>
+          <a:fontRef idx="minor">
+            <a:schemeClr val="tx1"/>
+          </a:fontRef>
+        </p:style>
+      </p:cxnSp>
+      <p:sp>
+        <p:nvSpPr>
+          <p:cNvPr id="64" name="Cloud 63"/>
+          <p:cNvSpPr/>
+          <p:nvPr/>
+        </p:nvSpPr>
+        <p:spPr>
+          <a:xfrm>
+            <a:off x="332126" y="2090732"/>
+            <a:ext cx="1901904" cy="1216539"/>
+          </a:xfrm>
+          <a:prstGeom prst="cloud">
+            <a:avLst/>
+          </a:prstGeom>
+        </p:spPr>
+        <p:style>
+          <a:lnRef idx="2">
+            <a:schemeClr val="accent1">
+              <a:shade val="50000"/>
+            </a:schemeClr>
+          </a:lnRef>
+          <a:fillRef idx="1">
+            <a:schemeClr val="accent1"/>
+          </a:fillRef>
+          <a:effectRef idx="0">
+            <a:schemeClr val="accent1"/>
+          </a:effectRef>
+          <a:fontRef idx="minor">
+            <a:schemeClr val="lt1"/>
+          </a:fontRef>
+        </p:style>
+        <p:txBody>
+          <a:bodyPr rtlCol="0" anchor="ctr"/>
+          <a:lstStyle/>
+          <a:p>
+            <a:pPr algn="ctr"/>
+            <a:r>
+              <a:rPr lang="en-US" dirty="0" smtClean="0"/>
+              <a:t>Providers</a:t>
+            </a:r>
+            <a:endParaRPr lang="en-US" dirty="0"/>
+          </a:p>
+        </p:txBody>
+      </p:sp>
+      <p:cxnSp>
+        <p:nvCxnSpPr>
+          <p:cNvPr id="65" name="Straight Arrow Connector 64"/>
+          <p:cNvCxnSpPr>
+            <a:stCxn id="64" idx="1"/>
+            <a:endCxn id="39" idx="0"/>
+          </p:cNvCxnSpPr>
+          <p:nvPr/>
+        </p:nvCxnSpPr>
+        <p:spPr>
+          <a:xfrm flipH="1">
+            <a:off x="1279581" y="3305976"/>
+            <a:ext cx="3497" cy="623696"/>
+          </a:xfrm>
+          <a:prstGeom prst="straightConnector1">
+            <a:avLst/>
+          </a:prstGeom>
+          <a:ln>
+            <a:headEnd type="triangle"/>
+            <a:tailEnd type="triangle"/>
+          </a:ln>
+        </p:spPr>
+        <p:style>
+          <a:lnRef idx="1">
+            <a:schemeClr val="accent1"/>
+          </a:lnRef>
+          <a:fillRef idx="0">
+            <a:schemeClr val="accent1"/>
+          </a:fillRef>
+          <a:effectRef idx="0">
+            <a:schemeClr val="accent1"/>
+          </a:effectRef>
+          <a:fontRef idx="minor">
+            <a:schemeClr val="tx1"/>
+          </a:fontRef>
+        </p:style>
+      </p:cxnSp>
+      <p:cxnSp>
+        <p:nvCxnSpPr>
+          <p:cNvPr id="66" name="Straight Arrow Connector 65"/>
+          <p:cNvCxnSpPr/>
+          <p:nvPr/>
+        </p:nvCxnSpPr>
+        <p:spPr>
+          <a:xfrm>
+            <a:off x="1885972" y="4583063"/>
+            <a:ext cx="2377619" cy="12763"/>
+          </a:xfrm>
+          <a:prstGeom prst="straightConnector1">
+            <a:avLst/>
+          </a:prstGeom>
+          <a:ln>
+            <a:headEnd type="triangle"/>
+            <a:tailEnd type="none"/>
+          </a:ln>
+        </p:spPr>
+        <p:style>
+          <a:lnRef idx="1">
+            <a:schemeClr val="accent1"/>
+          </a:lnRef>
+          <a:fillRef idx="0">
+            <a:schemeClr val="accent1"/>
+          </a:fillRef>
+          <a:effectRef idx="0">
+            <a:schemeClr val="accent1"/>
+          </a:effectRef>
+          <a:fontRef idx="minor">
+            <a:schemeClr val="tx1"/>
+          </a:fontRef>
+        </p:style>
+      </p:cxnSp>
+      <p:sp>
+        <p:nvSpPr>
+          <p:cNvPr id="67" name="TextBox 66"/>
+          <p:cNvSpPr txBox="1"/>
+          <p:nvPr/>
+        </p:nvSpPr>
+        <p:spPr>
+          <a:xfrm>
+            <a:off x="2428109" y="4408653"/>
+            <a:ext cx="1203529" cy="230832"/>
+          </a:xfrm>
+          <a:prstGeom prst="rect">
+            <a:avLst/>
+          </a:prstGeom>
+          <a:noFill/>
+        </p:spPr>
+        <p:txBody>
+          <a:bodyPr wrap="square" rtlCol="0">
+            <a:spAutoFit/>
+          </a:bodyPr>
+          <a:lstStyle/>
+          <a:p>
+            <a:pPr algn="ctr"/>
+            <a:r>
+              <a:rPr lang="en-US" sz="900" dirty="0"/>
+              <a:t>Decided </a:t>
+            </a:r>
+            <a:r>
+              <a:rPr lang="en-US" sz="900" dirty="0" smtClean="0"/>
+              <a:t>Requests</a:t>
+            </a:r>
+            <a:endParaRPr lang="en-US" sz="900" dirty="0"/>
+          </a:p>
+        </p:txBody>
+      </p:sp>
+      <p:cxnSp>
+        <p:nvCxnSpPr>
+          <p:cNvPr id="68" name="Elbow Connector 67"/>
+          <p:cNvCxnSpPr>
+            <a:endCxn id="42" idx="1"/>
+          </p:cNvCxnSpPr>
+          <p:nvPr/>
+        </p:nvCxnSpPr>
+        <p:spPr>
+          <a:xfrm rot="5400000" flipH="1" flipV="1">
+            <a:off x="7323999" y="2996684"/>
+            <a:ext cx="1456854" cy="639952"/>
+          </a:xfrm>
+          <a:prstGeom prst="bentConnector2">
+            <a:avLst/>
+          </a:prstGeom>
+          <a:ln>
+            <a:tailEnd type="triangle"/>
+          </a:ln>
+        </p:spPr>
+        <p:style>
+          <a:lnRef idx="1">
+            <a:schemeClr val="accent1"/>
+          </a:lnRef>
+          <a:fillRef idx="0">
+            <a:schemeClr val="accent1"/>
+          </a:fillRef>
+          <a:effectRef idx="0">
+            <a:schemeClr val="accent1"/>
+          </a:effectRef>
+          <a:fontRef idx="minor">
+            <a:schemeClr val="tx1"/>
+          </a:fontRef>
+        </p:style>
+      </p:cxnSp>
+      <p:cxnSp>
+        <p:nvCxnSpPr>
+          <p:cNvPr id="69" name="Elbow Connector 68"/>
+          <p:cNvCxnSpPr>
+            <a:stCxn id="42" idx="3"/>
+          </p:cNvCxnSpPr>
+          <p:nvPr/>
+        </p:nvCxnSpPr>
+        <p:spPr>
+          <a:xfrm>
+            <a:off x="9585185" y="2588233"/>
+            <a:ext cx="810566" cy="1441444"/>
+          </a:xfrm>
+          <a:prstGeom prst="bentConnector2">
+            <a:avLst/>
+          </a:prstGeom>
+          <a:ln>
+            <a:tailEnd type="triangle"/>
+          </a:ln>
+        </p:spPr>
+        <p:style>
+          <a:lnRef idx="1">
+            <a:schemeClr val="accent1"/>
+          </a:lnRef>
+          <a:fillRef idx="0">
+            <a:schemeClr val="accent1"/>
+          </a:fillRef>
+          <a:effectRef idx="0">
+            <a:schemeClr val="accent1"/>
+          </a:effectRef>
+          <a:fontRef idx="minor">
+            <a:schemeClr val="tx1"/>
+          </a:fontRef>
+        </p:style>
+      </p:cxnSp>
+      <p:sp>
+        <p:nvSpPr>
+          <p:cNvPr id="70" name="Title 1"/>
           <p:cNvSpPr>
             <a:spLocks noGrp="1"/>
           </p:cNvSpPr>
@@ -3055,60 +4452,71 @@
             <p:ph type="title"/>
           </p:nvPr>
         </p:nvSpPr>
-        <p:spPr/>
+        <p:spPr>
+          <a:xfrm>
+            <a:off x="838200" y="365125"/>
+            <a:ext cx="10515600" cy="1325563"/>
+          </a:xfrm>
+        </p:spPr>
         <p:txBody>
           <a:bodyPr/>
           <a:lstStyle/>
           <a:p>
             <a:r>
               <a:rPr lang="en-US" dirty="0" smtClean="0"/>
-              <a:t>Cleanup Azure Resources</a:t>
+              <a:t>Final Solution</a:t>
             </a:r>
             <a:endParaRPr lang="en-US" dirty="0"/>
           </a:p>
         </p:txBody>
       </p:sp>
-      <p:sp>
-        <p:nvSpPr>
-          <p:cNvPr id="5" name="Content Placeholder 4"/>
-          <p:cNvSpPr>
-            <a:spLocks noGrp="1"/>
-          </p:cNvSpPr>
-          <p:nvPr>
-            <p:ph idx="1"/>
-          </p:nvPr>
-        </p:nvSpPr>
-        <p:spPr/>
-        <p:txBody>
-          <a:bodyPr/>
-          <a:lstStyle/>
-          <a:p>
-            <a:r>
-              <a:rPr lang="en-US" dirty="0" smtClean="0"/>
-              <a:t>Don’t want to leave this resources running because they will cost you, but we can export scripts that you can reapply later if you might want to work on this more later</a:t>
-            </a:r>
-          </a:p>
-          <a:p>
-            <a:endParaRPr lang="en-US" dirty="0" smtClean="0"/>
-          </a:p>
-          <a:p>
-            <a:r>
-              <a:rPr lang="en-US" dirty="0" smtClean="0"/>
-              <a:t>Delete resources</a:t>
-            </a:r>
-          </a:p>
-        </p:txBody>
-      </p:sp>
+      <p:pic>
+        <p:nvPicPr>
+          <p:cNvPr id="36" name="Picture 35"/>
+          <p:cNvPicPr>
+            <a:picLocks noChangeAspect="1"/>
+          </p:cNvPicPr>
+          <p:nvPr/>
+        </p:nvPicPr>
+        <p:blipFill>
+          <a:blip r:embed="rId2" cstate="print">
+            <a:extLst>
+              <a:ext uri="{28A0092B-C50C-407E-A947-70E740481C1C}">
+                <a14:useLocalDpi xmlns:a14="http://schemas.microsoft.com/office/drawing/2010/main" val="0"/>
+              </a:ext>
+            </a:extLst>
+          </a:blip>
+          <a:stretch>
+            <a:fillRect/>
+          </a:stretch>
+        </p:blipFill>
+        <p:spPr>
+          <a:xfrm>
+            <a:off x="9135291" y="292047"/>
+            <a:ext cx="2455817" cy="1381224"/>
+          </a:xfrm>
+          <a:prstGeom prst="rect">
+            <a:avLst/>
+          </a:prstGeom>
+        </p:spPr>
+      </p:pic>
     </p:spTree>
     <p:extLst>
       <p:ext uri="{BB962C8B-B14F-4D97-AF65-F5344CB8AC3E}">
-        <p14:creationId xmlns:p14="http://schemas.microsoft.com/office/powerpoint/2010/main" val="3733458452"/>
+        <p14:creationId xmlns:p14="http://schemas.microsoft.com/office/powerpoint/2010/main" val="1387715407"/>
       </p:ext>
     </p:extLst>
   </p:cSld>
   <p:clrMapOvr>
     <a:masterClrMapping/>
   </p:clrMapOvr>
+  <p:timing>
+    <p:tnLst>
+      <p:par>
+        <p:cTn id="1" dur="indefinite" restart="never" nodeType="tmRoot"/>
+      </p:par>
+    </p:tnLst>
+  </p:timing>
 </p:sld>
 </file>
 
@@ -3146,7 +4554,11 @@
           <a:p>
             <a:r>
               <a:rPr lang="en-US" dirty="0" smtClean="0"/>
-              <a:t>What Have We Learned?</a:t>
+              <a:t>Revisiting Prior </a:t>
+            </a:r>
+            <a:r>
+              <a:rPr lang="en-US" dirty="0" smtClean="0"/>
+              <a:t>Issues</a:t>
             </a:r>
             <a:endParaRPr lang="en-US" dirty="0"/>
           </a:p>
@@ -3164,23 +4576,82 @@
         </p:nvSpPr>
         <p:spPr/>
         <p:txBody>
-          <a:bodyPr/>
-          <a:lstStyle/>
-          <a:p>
-            <a:endParaRPr lang="en-US"/>
-          </a:p>
-        </p:txBody>
-      </p:sp>
+          <a:bodyPr>
+            <a:normAutofit/>
+          </a:bodyPr>
+          <a:lstStyle/>
+          <a:p>
+            <a:r>
+              <a:rPr lang="en-US" i="1" dirty="0" smtClean="0"/>
+              <a:t>Solution not keeping pace with rapidly growing business</a:t>
+            </a:r>
+          </a:p>
+          <a:p>
+            <a:pPr lvl="1"/>
+            <a:r>
+              <a:rPr lang="en-US" i="1" dirty="0" smtClean="0"/>
+              <a:t>Users receive timeout errors during busy times</a:t>
+            </a:r>
+          </a:p>
+          <a:p>
+            <a:endParaRPr lang="en-US" dirty="0" smtClean="0"/>
+          </a:p>
+          <a:p>
+            <a:r>
+              <a:rPr lang="en-US" b="1" dirty="0" smtClean="0"/>
+              <a:t>Services are now working from local repos rather than putting increasing strain on a centralized DB</a:t>
+            </a:r>
+            <a:endParaRPr lang="en-US" b="1" dirty="0" smtClean="0"/>
+          </a:p>
+        </p:txBody>
+      </p:sp>
+      <p:pic>
+        <p:nvPicPr>
+          <p:cNvPr id="4" name="Picture 3"/>
+          <p:cNvPicPr>
+            <a:picLocks noChangeAspect="1"/>
+          </p:cNvPicPr>
+          <p:nvPr/>
+        </p:nvPicPr>
+        <p:blipFill>
+          <a:blip r:embed="rId2" cstate="print">
+            <a:extLst>
+              <a:ext uri="{28A0092B-C50C-407E-A947-70E740481C1C}">
+                <a14:useLocalDpi xmlns:a14="http://schemas.microsoft.com/office/drawing/2010/main" val="0"/>
+              </a:ext>
+            </a:extLst>
+          </a:blip>
+          <a:stretch>
+            <a:fillRect/>
+          </a:stretch>
+        </p:blipFill>
+        <p:spPr>
+          <a:xfrm>
+            <a:off x="9135291" y="292047"/>
+            <a:ext cx="2455817" cy="1381224"/>
+          </a:xfrm>
+          <a:prstGeom prst="rect">
+            <a:avLst/>
+          </a:prstGeom>
+        </p:spPr>
+      </p:pic>
     </p:spTree>
     <p:extLst>
       <p:ext uri="{BB962C8B-B14F-4D97-AF65-F5344CB8AC3E}">
-        <p14:creationId xmlns:p14="http://schemas.microsoft.com/office/powerpoint/2010/main" val="4036846334"/>
+        <p14:creationId xmlns:p14="http://schemas.microsoft.com/office/powerpoint/2010/main" val="3081745093"/>
       </p:ext>
     </p:extLst>
   </p:cSld>
   <p:clrMapOvr>
     <a:masterClrMapping/>
   </p:clrMapOvr>
+  <p:timing>
+    <p:tnLst>
+      <p:par>
+        <p:cTn id="1" dur="indefinite" restart="never" nodeType="tmRoot"/>
+      </p:par>
+    </p:tnLst>
+  </p:timing>
 </p:sld>
 </file>
 
@@ -3217,8 +4688,8 @@
           <a:lstStyle/>
           <a:p>
             <a:r>
-              <a:rPr lang="en-US" dirty="0" smtClean="0"/>
-              <a:t>Limitations</a:t>
+              <a:rPr lang="en-US" dirty="0"/>
+              <a:t>Revisiting Prior Issues</a:t>
             </a:r>
             <a:endParaRPr lang="en-US" dirty="0"/>
           </a:p>
@@ -3236,23 +4707,112 @@
         </p:nvSpPr>
         <p:spPr/>
         <p:txBody>
-          <a:bodyPr/>
-          <a:lstStyle/>
-          <a:p>
-            <a:endParaRPr lang="en-US"/>
-          </a:p>
-        </p:txBody>
-      </p:sp>
+          <a:bodyPr>
+            <a:normAutofit/>
+          </a:bodyPr>
+          <a:lstStyle/>
+          <a:p>
+            <a:r>
+              <a:rPr lang="en-US" i="1" dirty="0" smtClean="0"/>
+              <a:t>Solution not keeping pace with rapidly growing business</a:t>
+            </a:r>
+          </a:p>
+          <a:p>
+            <a:pPr lvl="1"/>
+            <a:r>
+              <a:rPr lang="en-US" i="1" dirty="0" smtClean="0"/>
+              <a:t>Lead </a:t>
+            </a:r>
+            <a:r>
+              <a:rPr lang="en-US" i="1" dirty="0" smtClean="0"/>
+              <a:t>time for new hardware limiting system’s ability to scale</a:t>
+            </a:r>
+          </a:p>
+          <a:p>
+            <a:pPr lvl="2"/>
+            <a:r>
+              <a:rPr lang="en-US" i="1" dirty="0" smtClean="0"/>
+              <a:t>Management hesitant to let servers to sit idle during non-peak times</a:t>
+            </a:r>
+          </a:p>
+          <a:p>
+            <a:pPr lvl="1"/>
+            <a:r>
+              <a:rPr lang="en-US" i="1" dirty="0" smtClean="0"/>
+              <a:t>Team does not have skills to manage network load balancing</a:t>
+            </a:r>
+          </a:p>
+          <a:p>
+            <a:endParaRPr lang="en-US" dirty="0" smtClean="0"/>
+          </a:p>
+          <a:p>
+            <a:r>
+              <a:rPr lang="en-US" b="1" dirty="0" smtClean="0"/>
+              <a:t>Azure resources can be added with little lead time</a:t>
+            </a:r>
+          </a:p>
+          <a:p>
+            <a:r>
+              <a:rPr lang="en-US" b="1" dirty="0" smtClean="0"/>
+              <a:t>Built-in auto-scaling with more options available for additional cost</a:t>
+            </a:r>
+          </a:p>
+          <a:p>
+            <a:r>
+              <a:rPr lang="en-US" b="1" dirty="0" smtClean="0"/>
+              <a:t>Minimal load balancing configuration necessary</a:t>
+            </a:r>
+            <a:endParaRPr lang="en-US" b="1" dirty="0" smtClean="0"/>
+          </a:p>
+        </p:txBody>
+      </p:sp>
+      <p:pic>
+        <p:nvPicPr>
+          <p:cNvPr id="4" name="Picture 3"/>
+          <p:cNvPicPr>
+            <a:picLocks noChangeAspect="1"/>
+          </p:cNvPicPr>
+          <p:nvPr/>
+        </p:nvPicPr>
+        <p:blipFill>
+          <a:blip r:embed="rId2" cstate="print">
+            <a:extLst>
+              <a:ext uri="{28A0092B-C50C-407E-A947-70E740481C1C}">
+                <a14:useLocalDpi xmlns:a14="http://schemas.microsoft.com/office/drawing/2010/main" val="0"/>
+              </a:ext>
+            </a:extLst>
+          </a:blip>
+          <a:stretch>
+            <a:fillRect/>
+          </a:stretch>
+        </p:blipFill>
+        <p:spPr>
+          <a:xfrm>
+            <a:off x="9135291" y="292047"/>
+            <a:ext cx="2455817" cy="1381224"/>
+          </a:xfrm>
+          <a:prstGeom prst="rect">
+            <a:avLst/>
+          </a:prstGeom>
+        </p:spPr>
+      </p:pic>
     </p:spTree>
     <p:extLst>
       <p:ext uri="{BB962C8B-B14F-4D97-AF65-F5344CB8AC3E}">
-        <p14:creationId xmlns:p14="http://schemas.microsoft.com/office/powerpoint/2010/main" val="3148072076"/>
+        <p14:creationId xmlns:p14="http://schemas.microsoft.com/office/powerpoint/2010/main" val="2736898337"/>
       </p:ext>
     </p:extLst>
   </p:cSld>
   <p:clrMapOvr>
     <a:masterClrMapping/>
   </p:clrMapOvr>
+  <p:timing>
+    <p:tnLst>
+      <p:par>
+        <p:cTn id="1" dur="indefinite" restart="never" nodeType="tmRoot"/>
+      </p:par>
+    </p:tnLst>
+  </p:timing>
 </p:sld>
 </file>
 
@@ -3289,6 +4849,533 @@
           <a:lstStyle/>
           <a:p>
             <a:r>
+              <a:rPr lang="en-US" dirty="0"/>
+              <a:t>Revisiting Prior Issues</a:t>
+            </a:r>
+            <a:endParaRPr lang="en-US" dirty="0"/>
+          </a:p>
+        </p:txBody>
+      </p:sp>
+      <p:sp>
+        <p:nvSpPr>
+          <p:cNvPr id="3" name="Content Placeholder 2"/>
+          <p:cNvSpPr>
+            <a:spLocks noGrp="1"/>
+          </p:cNvSpPr>
+          <p:nvPr>
+            <p:ph idx="1"/>
+          </p:nvPr>
+        </p:nvSpPr>
+        <p:spPr/>
+        <p:txBody>
+          <a:bodyPr>
+            <a:normAutofit/>
+          </a:bodyPr>
+          <a:lstStyle/>
+          <a:p>
+            <a:r>
+              <a:rPr lang="en-US" i="1" dirty="0" smtClean="0"/>
+              <a:t>Turnaround </a:t>
+            </a:r>
+            <a:r>
+              <a:rPr lang="en-US" i="1" dirty="0" smtClean="0"/>
+              <a:t>time for providers needs to be reduced from days to hours</a:t>
+            </a:r>
+          </a:p>
+          <a:p>
+            <a:pPr lvl="1"/>
+            <a:r>
+              <a:rPr lang="en-US" i="1" dirty="0" smtClean="0"/>
+              <a:t>Input/output from/to providers only done in nightly </a:t>
+            </a:r>
+            <a:r>
+              <a:rPr lang="en-US" i="1" dirty="0" smtClean="0"/>
+              <a:t>jobs</a:t>
+            </a:r>
+          </a:p>
+          <a:p>
+            <a:pPr lvl="1"/>
+            <a:endParaRPr lang="en-US" dirty="0"/>
+          </a:p>
+          <a:p>
+            <a:r>
+              <a:rPr lang="en-US" b="1" dirty="0" smtClean="0"/>
+              <a:t>Events indicating decisions made on requests are available in real time on the message bus</a:t>
+            </a:r>
+            <a:endParaRPr lang="en-US" b="1" dirty="0" smtClean="0"/>
+          </a:p>
+        </p:txBody>
+      </p:sp>
+      <p:pic>
+        <p:nvPicPr>
+          <p:cNvPr id="4" name="Picture 3"/>
+          <p:cNvPicPr>
+            <a:picLocks noChangeAspect="1"/>
+          </p:cNvPicPr>
+          <p:nvPr/>
+        </p:nvPicPr>
+        <p:blipFill>
+          <a:blip r:embed="rId2" cstate="print">
+            <a:extLst>
+              <a:ext uri="{28A0092B-C50C-407E-A947-70E740481C1C}">
+                <a14:useLocalDpi xmlns:a14="http://schemas.microsoft.com/office/drawing/2010/main" val="0"/>
+              </a:ext>
+            </a:extLst>
+          </a:blip>
+          <a:stretch>
+            <a:fillRect/>
+          </a:stretch>
+        </p:blipFill>
+        <p:spPr>
+          <a:xfrm>
+            <a:off x="9135291" y="292047"/>
+            <a:ext cx="2455817" cy="1381224"/>
+          </a:xfrm>
+          <a:prstGeom prst="rect">
+            <a:avLst/>
+          </a:prstGeom>
+        </p:spPr>
+      </p:pic>
+    </p:spTree>
+    <p:extLst>
+      <p:ext uri="{BB962C8B-B14F-4D97-AF65-F5344CB8AC3E}">
+        <p14:creationId xmlns:p14="http://schemas.microsoft.com/office/powerpoint/2010/main" val="1563509206"/>
+      </p:ext>
+    </p:extLst>
+  </p:cSld>
+  <p:clrMapOvr>
+    <a:masterClrMapping/>
+  </p:clrMapOvr>
+  <p:timing>
+    <p:tnLst>
+      <p:par>
+        <p:cTn id="1" dur="indefinite" restart="never" nodeType="tmRoot"/>
+      </p:par>
+    </p:tnLst>
+  </p:timing>
+</p:sld>
+</file>
+
+<file path=ppt/slides/slide6.xml><?xml version="1.0" encoding="utf-8"?>
+<p:sld xmlns:a="http://schemas.openxmlformats.org/drawingml/2006/main" xmlns:r="http://schemas.openxmlformats.org/officeDocument/2006/relationships" xmlns:p="http://schemas.openxmlformats.org/presentationml/2006/main">
+  <p:cSld>
+    <p:spTree>
+      <p:nvGrpSpPr>
+        <p:cNvPr id="1" name=""/>
+        <p:cNvGrpSpPr/>
+        <p:nvPr/>
+      </p:nvGrpSpPr>
+      <p:grpSpPr>
+        <a:xfrm>
+          <a:off x="0" y="0"/>
+          <a:ext cx="0" cy="0"/>
+          <a:chOff x="0" y="0"/>
+          <a:chExt cx="0" cy="0"/>
+        </a:xfrm>
+      </p:grpSpPr>
+      <p:sp>
+        <p:nvSpPr>
+          <p:cNvPr id="2" name="Title 1"/>
+          <p:cNvSpPr>
+            <a:spLocks noGrp="1"/>
+          </p:cNvSpPr>
+          <p:nvPr>
+            <p:ph type="title"/>
+          </p:nvPr>
+        </p:nvSpPr>
+        <p:spPr/>
+        <p:txBody>
+          <a:bodyPr/>
+          <a:lstStyle/>
+          <a:p>
+            <a:r>
+              <a:rPr lang="en-US" dirty="0"/>
+              <a:t>Revisiting Prior Issues</a:t>
+            </a:r>
+            <a:endParaRPr lang="en-US" dirty="0"/>
+          </a:p>
+        </p:txBody>
+      </p:sp>
+      <p:sp>
+        <p:nvSpPr>
+          <p:cNvPr id="3" name="Content Placeholder 2"/>
+          <p:cNvSpPr>
+            <a:spLocks noGrp="1"/>
+          </p:cNvSpPr>
+          <p:nvPr>
+            <p:ph idx="1"/>
+          </p:nvPr>
+        </p:nvSpPr>
+        <p:spPr/>
+        <p:txBody>
+          <a:bodyPr>
+            <a:normAutofit/>
+          </a:bodyPr>
+          <a:lstStyle/>
+          <a:p>
+            <a:r>
+              <a:rPr lang="en-US" i="1" dirty="0" smtClean="0"/>
+              <a:t>New </a:t>
+            </a:r>
+            <a:r>
+              <a:rPr lang="en-US" i="1" dirty="0" smtClean="0"/>
+              <a:t>features and enhancements take too long or not possible</a:t>
+            </a:r>
+          </a:p>
+          <a:p>
+            <a:pPr lvl="1"/>
+            <a:r>
+              <a:rPr lang="en-US" i="1" dirty="0" smtClean="0"/>
+              <a:t>Need real-time view of active requests, but additional load likely to lead to additional performance </a:t>
+            </a:r>
+            <a:r>
+              <a:rPr lang="en-US" i="1" dirty="0" smtClean="0"/>
+              <a:t>issues</a:t>
+            </a:r>
+          </a:p>
+          <a:p>
+            <a:pPr lvl="1"/>
+            <a:endParaRPr lang="en-US" i="1" dirty="0"/>
+          </a:p>
+          <a:p>
+            <a:r>
+              <a:rPr lang="en-US" b="1" dirty="0" smtClean="0"/>
+              <a:t>New components can now be added with little impact on existing ones</a:t>
+            </a:r>
+          </a:p>
+          <a:p>
+            <a:r>
+              <a:rPr lang="en-US" b="1" dirty="0" smtClean="0"/>
+              <a:t>Real-time information is accessible in the Message Bus without straining other processes</a:t>
+            </a:r>
+            <a:endParaRPr lang="en-US" b="1" dirty="0" smtClean="0"/>
+          </a:p>
+        </p:txBody>
+      </p:sp>
+      <p:pic>
+        <p:nvPicPr>
+          <p:cNvPr id="4" name="Picture 3"/>
+          <p:cNvPicPr>
+            <a:picLocks noChangeAspect="1"/>
+          </p:cNvPicPr>
+          <p:nvPr/>
+        </p:nvPicPr>
+        <p:blipFill>
+          <a:blip r:embed="rId2" cstate="print">
+            <a:extLst>
+              <a:ext uri="{28A0092B-C50C-407E-A947-70E740481C1C}">
+                <a14:useLocalDpi xmlns:a14="http://schemas.microsoft.com/office/drawing/2010/main" val="0"/>
+              </a:ext>
+            </a:extLst>
+          </a:blip>
+          <a:stretch>
+            <a:fillRect/>
+          </a:stretch>
+        </p:blipFill>
+        <p:spPr>
+          <a:xfrm>
+            <a:off x="9135291" y="292047"/>
+            <a:ext cx="2455817" cy="1381224"/>
+          </a:xfrm>
+          <a:prstGeom prst="rect">
+            <a:avLst/>
+          </a:prstGeom>
+        </p:spPr>
+      </p:pic>
+    </p:spTree>
+    <p:extLst>
+      <p:ext uri="{BB962C8B-B14F-4D97-AF65-F5344CB8AC3E}">
+        <p14:creationId xmlns:p14="http://schemas.microsoft.com/office/powerpoint/2010/main" val="1569806623"/>
+      </p:ext>
+    </p:extLst>
+  </p:cSld>
+  <p:clrMapOvr>
+    <a:masterClrMapping/>
+  </p:clrMapOvr>
+  <p:timing>
+    <p:tnLst>
+      <p:par>
+        <p:cTn id="1" dur="indefinite" restart="never" nodeType="tmRoot"/>
+      </p:par>
+    </p:tnLst>
+  </p:timing>
+</p:sld>
+</file>
+
+<file path=ppt/slides/slide7.xml><?xml version="1.0" encoding="utf-8"?>
+<p:sld xmlns:a="http://schemas.openxmlformats.org/drawingml/2006/main" xmlns:r="http://schemas.openxmlformats.org/officeDocument/2006/relationships" xmlns:p="http://schemas.openxmlformats.org/presentationml/2006/main">
+  <p:cSld>
+    <p:spTree>
+      <p:nvGrpSpPr>
+        <p:cNvPr id="1" name=""/>
+        <p:cNvGrpSpPr/>
+        <p:nvPr/>
+      </p:nvGrpSpPr>
+      <p:grpSpPr>
+        <a:xfrm>
+          <a:off x="0" y="0"/>
+          <a:ext cx="0" cy="0"/>
+          <a:chOff x="0" y="0"/>
+          <a:chExt cx="0" cy="0"/>
+        </a:xfrm>
+      </p:grpSpPr>
+      <p:sp>
+        <p:nvSpPr>
+          <p:cNvPr id="2" name="Title 1"/>
+          <p:cNvSpPr>
+            <a:spLocks noGrp="1"/>
+          </p:cNvSpPr>
+          <p:nvPr>
+            <p:ph type="title"/>
+          </p:nvPr>
+        </p:nvSpPr>
+        <p:spPr/>
+        <p:txBody>
+          <a:bodyPr/>
+          <a:lstStyle/>
+          <a:p>
+            <a:r>
+              <a:rPr lang="en-US" dirty="0" smtClean="0"/>
+              <a:t>What Have We Learned?</a:t>
+            </a:r>
+            <a:endParaRPr lang="en-US" dirty="0"/>
+          </a:p>
+        </p:txBody>
+      </p:sp>
+      <p:sp>
+        <p:nvSpPr>
+          <p:cNvPr id="3" name="Content Placeholder 2"/>
+          <p:cNvSpPr>
+            <a:spLocks noGrp="1"/>
+          </p:cNvSpPr>
+          <p:nvPr>
+            <p:ph idx="1"/>
+          </p:nvPr>
+        </p:nvSpPr>
+        <p:spPr/>
+        <p:txBody>
+          <a:bodyPr>
+            <a:normAutofit lnSpcReduction="10000"/>
+          </a:bodyPr>
+          <a:lstStyle/>
+          <a:p>
+            <a:r>
+              <a:rPr lang="en-US" dirty="0" smtClean="0"/>
+              <a:t>Manage resources in Azure</a:t>
+            </a:r>
+          </a:p>
+          <a:p>
+            <a:pPr lvl="1"/>
+            <a:r>
+              <a:rPr lang="en-US" dirty="0" smtClean="0"/>
+              <a:t>Creating in Azure</a:t>
+            </a:r>
+          </a:p>
+          <a:p>
+            <a:pPr lvl="1"/>
+            <a:r>
+              <a:rPr lang="en-US" dirty="0" smtClean="0"/>
+              <a:t>Publishing to Azure</a:t>
+            </a:r>
+          </a:p>
+          <a:p>
+            <a:pPr lvl="1"/>
+            <a:r>
+              <a:rPr lang="en-US" dirty="0" smtClean="0"/>
+              <a:t>Creating via Azure Resource Management (ARM) templates</a:t>
+            </a:r>
+          </a:p>
+          <a:p>
+            <a:pPr lvl="1"/>
+            <a:r>
+              <a:rPr lang="en-US" dirty="0" smtClean="0"/>
+              <a:t>Configuring/updating/monitoring in the portal</a:t>
+            </a:r>
+          </a:p>
+          <a:p>
+            <a:r>
+              <a:rPr lang="en-US" dirty="0" smtClean="0"/>
+              <a:t>Connect to Message Bus to publish/consume events</a:t>
+            </a:r>
+          </a:p>
+          <a:p>
+            <a:pPr lvl="1"/>
+            <a:r>
+              <a:rPr lang="en-US" dirty="0" smtClean="0"/>
+              <a:t>Create hubs</a:t>
+            </a:r>
+          </a:p>
+          <a:p>
+            <a:pPr lvl="1"/>
+            <a:r>
+              <a:rPr lang="en-US" dirty="0" smtClean="0"/>
+              <a:t>Configure access policies and consumer groups</a:t>
+            </a:r>
+          </a:p>
+          <a:p>
+            <a:r>
+              <a:rPr lang="en-US" dirty="0" smtClean="0"/>
+              <a:t>Use Azure Functions &amp; App Services</a:t>
+            </a:r>
+          </a:p>
+          <a:p>
+            <a:pPr lvl="1"/>
+            <a:r>
+              <a:rPr lang="en-US" dirty="0" smtClean="0"/>
+              <a:t>Timer trigger</a:t>
+            </a:r>
+          </a:p>
+          <a:p>
+            <a:pPr lvl="1"/>
+            <a:r>
+              <a:rPr lang="en-US" dirty="0" smtClean="0"/>
+              <a:t>Event hub trigger</a:t>
+            </a:r>
+            <a:endParaRPr lang="en-US" dirty="0"/>
+          </a:p>
+        </p:txBody>
+      </p:sp>
+    </p:spTree>
+    <p:extLst>
+      <p:ext uri="{BB962C8B-B14F-4D97-AF65-F5344CB8AC3E}">
+        <p14:creationId xmlns:p14="http://schemas.microsoft.com/office/powerpoint/2010/main" val="4036846334"/>
+      </p:ext>
+    </p:extLst>
+  </p:cSld>
+  <p:clrMapOvr>
+    <a:masterClrMapping/>
+  </p:clrMapOvr>
+</p:sld>
+</file>
+
+<file path=ppt/slides/slide8.xml><?xml version="1.0" encoding="utf-8"?>
+<p:sld xmlns:a="http://schemas.openxmlformats.org/drawingml/2006/main" xmlns:r="http://schemas.openxmlformats.org/officeDocument/2006/relationships" xmlns:p="http://schemas.openxmlformats.org/presentationml/2006/main">
+  <p:cSld>
+    <p:spTree>
+      <p:nvGrpSpPr>
+        <p:cNvPr id="1" name=""/>
+        <p:cNvGrpSpPr/>
+        <p:nvPr/>
+      </p:nvGrpSpPr>
+      <p:grpSpPr>
+        <a:xfrm>
+          <a:off x="0" y="0"/>
+          <a:ext cx="0" cy="0"/>
+          <a:chOff x="0" y="0"/>
+          <a:chExt cx="0" cy="0"/>
+        </a:xfrm>
+      </p:grpSpPr>
+      <p:sp>
+        <p:nvSpPr>
+          <p:cNvPr id="4" name="Title 3"/>
+          <p:cNvSpPr>
+            <a:spLocks noGrp="1"/>
+          </p:cNvSpPr>
+          <p:nvPr>
+            <p:ph type="title"/>
+          </p:nvPr>
+        </p:nvSpPr>
+        <p:spPr/>
+        <p:txBody>
+          <a:bodyPr/>
+          <a:lstStyle/>
+          <a:p>
+            <a:r>
+              <a:rPr lang="en-US" dirty="0" smtClean="0"/>
+              <a:t>Cleanup Azure Resources</a:t>
+            </a:r>
+            <a:endParaRPr lang="en-US" dirty="0"/>
+          </a:p>
+        </p:txBody>
+      </p:sp>
+      <p:sp>
+        <p:nvSpPr>
+          <p:cNvPr id="5" name="Content Placeholder 4"/>
+          <p:cNvSpPr>
+            <a:spLocks noGrp="1"/>
+          </p:cNvSpPr>
+          <p:nvPr>
+            <p:ph idx="1"/>
+          </p:nvPr>
+        </p:nvSpPr>
+        <p:spPr/>
+        <p:txBody>
+          <a:bodyPr/>
+          <a:lstStyle/>
+          <a:p>
+            <a:endParaRPr lang="en-US" dirty="0" smtClean="0"/>
+          </a:p>
+          <a:p>
+            <a:r>
+              <a:rPr lang="en-US" dirty="0" smtClean="0"/>
+              <a:t>Don’t </a:t>
+            </a:r>
+            <a:r>
+              <a:rPr lang="en-US" dirty="0" smtClean="0"/>
+              <a:t>want to leave </a:t>
+            </a:r>
+            <a:r>
+              <a:rPr lang="en-US" dirty="0" smtClean="0"/>
+              <a:t>these </a:t>
+            </a:r>
+            <a:r>
+              <a:rPr lang="en-US" dirty="0" smtClean="0"/>
+              <a:t>resources running because they will cost you, but we can export scripts that you can reapply later if you might want to work on this more </a:t>
+            </a:r>
+            <a:r>
+              <a:rPr lang="en-US" dirty="0" smtClean="0"/>
+              <a:t>later</a:t>
+            </a:r>
+            <a:endParaRPr lang="en-US" dirty="0" smtClean="0"/>
+          </a:p>
+        </p:txBody>
+      </p:sp>
+    </p:spTree>
+    <p:extLst>
+      <p:ext uri="{BB962C8B-B14F-4D97-AF65-F5344CB8AC3E}">
+        <p14:creationId xmlns:p14="http://schemas.microsoft.com/office/powerpoint/2010/main" val="3733458452"/>
+      </p:ext>
+    </p:extLst>
+  </p:cSld>
+  <p:clrMapOvr>
+    <a:masterClrMapping/>
+  </p:clrMapOvr>
+</p:sld>
+</file>
+
+<file path=ppt/slides/slide9.xml><?xml version="1.0" encoding="utf-8"?>
+<p:sld xmlns:a="http://schemas.openxmlformats.org/drawingml/2006/main" xmlns:r="http://schemas.openxmlformats.org/officeDocument/2006/relationships" xmlns:p="http://schemas.openxmlformats.org/presentationml/2006/main">
+  <p:cSld>
+    <p:spTree>
+      <p:nvGrpSpPr>
+        <p:cNvPr id="1" name=""/>
+        <p:cNvGrpSpPr/>
+        <p:nvPr/>
+      </p:nvGrpSpPr>
+      <p:grpSpPr>
+        <a:xfrm>
+          <a:off x="0" y="0"/>
+          <a:ext cx="0" cy="0"/>
+          <a:chOff x="0" y="0"/>
+          <a:chExt cx="0" cy="0"/>
+        </a:xfrm>
+      </p:grpSpPr>
+      <p:sp>
+        <p:nvSpPr>
+          <p:cNvPr id="2" name="Title 1"/>
+          <p:cNvSpPr>
+            <a:spLocks noGrp="1"/>
+          </p:cNvSpPr>
+          <p:nvPr>
+            <p:ph type="title"/>
+          </p:nvPr>
+        </p:nvSpPr>
+        <p:spPr/>
+        <p:txBody>
+          <a:bodyPr/>
+          <a:lstStyle/>
+          <a:p>
+            <a:r>
               <a:rPr lang="en-US" dirty="0" smtClean="0"/>
               <a:t>Contact Us</a:t>
             </a:r>
@@ -3311,7 +5398,42 @@
           <a:bodyPr/>
           <a:lstStyle/>
           <a:p>
-            <a:endParaRPr lang="en-US"/>
+            <a:endParaRPr lang="en-US" dirty="0" smtClean="0"/>
+          </a:p>
+          <a:p>
+            <a:r>
+              <a:rPr lang="en-US" dirty="0"/>
+              <a:t>Scott Carter: </a:t>
+            </a:r>
+            <a:r>
+              <a:rPr lang="en-US" dirty="0">
+                <a:hlinkClick r:id="rId2"/>
+              </a:rPr>
+              <a:t>scottctr@gmail.com</a:t>
+            </a:r>
+            <a:endParaRPr lang="en-US" dirty="0"/>
+          </a:p>
+          <a:p>
+            <a:endParaRPr lang="en-US" dirty="0" smtClean="0"/>
+          </a:p>
+          <a:p>
+            <a:r>
+              <a:rPr lang="en-US" dirty="0" smtClean="0"/>
+              <a:t>Todd Wheetley: </a:t>
+            </a:r>
+            <a:r>
+              <a:rPr lang="en-US" dirty="0" smtClean="0">
+                <a:hlinkClick r:id="rId3"/>
+              </a:rPr>
+              <a:t>wheetleytj@gmail.com</a:t>
+            </a:r>
+            <a:endParaRPr lang="en-US" dirty="0" smtClean="0"/>
+          </a:p>
+          <a:p>
+            <a:endParaRPr lang="en-US" dirty="0" smtClean="0"/>
+          </a:p>
+          <a:p>
+            <a:endParaRPr lang="en-US" dirty="0"/>
           </a:p>
         </p:txBody>
       </p:sp>

</xml_diff>